<commit_message>
changes due to final review
</commit_message>
<xml_diff>
--- a/CapstoneP2/ReportOuts/ModelApproachSensorTimeSeriesData.pptx
+++ b/CapstoneP2/ReportOuts/ModelApproachSensorTimeSeriesData.pptx
@@ -273,7 +273,7 @@
           <a:p>
             <a:fld id="{41700D12-4FA1-4E13-9BF0-A2DB108FDA70}" type="datetimeFigureOut">
               <a:rPr lang="en-US" smtClean="0"/>
-              <a:t>2/16/2020</a:t>
+              <a:t>2/18/2020</a:t>
             </a:fld>
             <a:endParaRPr lang="en-US"/>
           </a:p>
@@ -471,7 +471,7 @@
           <a:p>
             <a:fld id="{41700D12-4FA1-4E13-9BF0-A2DB108FDA70}" type="datetimeFigureOut">
               <a:rPr lang="en-US" smtClean="0"/>
-              <a:t>2/16/2020</a:t>
+              <a:t>2/18/2020</a:t>
             </a:fld>
             <a:endParaRPr lang="en-US"/>
           </a:p>
@@ -679,7 +679,7 @@
           <a:p>
             <a:fld id="{41700D12-4FA1-4E13-9BF0-A2DB108FDA70}" type="datetimeFigureOut">
               <a:rPr lang="en-US" smtClean="0"/>
-              <a:t>2/16/2020</a:t>
+              <a:t>2/18/2020</a:t>
             </a:fld>
             <a:endParaRPr lang="en-US"/>
           </a:p>
@@ -877,7 +877,7 @@
           <a:p>
             <a:fld id="{41700D12-4FA1-4E13-9BF0-A2DB108FDA70}" type="datetimeFigureOut">
               <a:rPr lang="en-US" smtClean="0"/>
-              <a:t>2/16/2020</a:t>
+              <a:t>2/18/2020</a:t>
             </a:fld>
             <a:endParaRPr lang="en-US"/>
           </a:p>
@@ -1152,7 +1152,7 @@
           <a:p>
             <a:fld id="{41700D12-4FA1-4E13-9BF0-A2DB108FDA70}" type="datetimeFigureOut">
               <a:rPr lang="en-US" smtClean="0"/>
-              <a:t>2/16/2020</a:t>
+              <a:t>2/18/2020</a:t>
             </a:fld>
             <a:endParaRPr lang="en-US"/>
           </a:p>
@@ -1417,7 +1417,7 @@
           <a:p>
             <a:fld id="{41700D12-4FA1-4E13-9BF0-A2DB108FDA70}" type="datetimeFigureOut">
               <a:rPr lang="en-US" smtClean="0"/>
-              <a:t>2/16/2020</a:t>
+              <a:t>2/18/2020</a:t>
             </a:fld>
             <a:endParaRPr lang="en-US"/>
           </a:p>
@@ -1829,7 +1829,7 @@
           <a:p>
             <a:fld id="{41700D12-4FA1-4E13-9BF0-A2DB108FDA70}" type="datetimeFigureOut">
               <a:rPr lang="en-US" smtClean="0"/>
-              <a:t>2/16/2020</a:t>
+              <a:t>2/18/2020</a:t>
             </a:fld>
             <a:endParaRPr lang="en-US"/>
           </a:p>
@@ -1970,7 +1970,7 @@
           <a:p>
             <a:fld id="{41700D12-4FA1-4E13-9BF0-A2DB108FDA70}" type="datetimeFigureOut">
               <a:rPr lang="en-US" smtClean="0"/>
-              <a:t>2/16/2020</a:t>
+              <a:t>2/18/2020</a:t>
             </a:fld>
             <a:endParaRPr lang="en-US"/>
           </a:p>
@@ -2083,7 +2083,7 @@
           <a:p>
             <a:fld id="{41700D12-4FA1-4E13-9BF0-A2DB108FDA70}" type="datetimeFigureOut">
               <a:rPr lang="en-US" smtClean="0"/>
-              <a:t>2/16/2020</a:t>
+              <a:t>2/18/2020</a:t>
             </a:fld>
             <a:endParaRPr lang="en-US"/>
           </a:p>
@@ -2394,7 +2394,7 @@
           <a:p>
             <a:fld id="{41700D12-4FA1-4E13-9BF0-A2DB108FDA70}" type="datetimeFigureOut">
               <a:rPr lang="en-US" smtClean="0"/>
-              <a:t>2/16/2020</a:t>
+              <a:t>2/18/2020</a:t>
             </a:fld>
             <a:endParaRPr lang="en-US"/>
           </a:p>
@@ -2682,7 +2682,7 @@
           <a:p>
             <a:fld id="{41700D12-4FA1-4E13-9BF0-A2DB108FDA70}" type="datetimeFigureOut">
               <a:rPr lang="en-US" smtClean="0"/>
-              <a:t>2/16/2020</a:t>
+              <a:t>2/18/2020</a:t>
             </a:fld>
             <a:endParaRPr lang="en-US"/>
           </a:p>
@@ -2923,7 +2923,7 @@
           <a:p>
             <a:fld id="{41700D12-4FA1-4E13-9BF0-A2DB108FDA70}" type="datetimeFigureOut">
               <a:rPr lang="en-US" smtClean="0"/>
-              <a:t>2/16/2020</a:t>
+              <a:t>2/18/2020</a:t>
             </a:fld>
             <a:endParaRPr lang="en-US"/>
           </a:p>
@@ -4247,7 +4247,7 @@
         </p:nvSpPr>
         <p:spPr>
           <a:xfrm>
-            <a:off x="1261508" y="4022544"/>
+            <a:off x="682667" y="4022544"/>
             <a:ext cx="391886" cy="2202025"/>
           </a:xfrm>
           <a:prstGeom prst="rect">
@@ -4293,7 +4293,7 @@
         </p:nvSpPr>
         <p:spPr>
           <a:xfrm>
-            <a:off x="2931686" y="4022543"/>
+            <a:off x="2352845" y="4022543"/>
             <a:ext cx="391886" cy="2202025"/>
           </a:xfrm>
           <a:prstGeom prst="rect">
@@ -4339,7 +4339,7 @@
         </p:nvSpPr>
         <p:spPr>
           <a:xfrm>
-            <a:off x="2325709" y="4022543"/>
+            <a:off x="1746868" y="4022543"/>
             <a:ext cx="391886" cy="2202025"/>
           </a:xfrm>
           <a:prstGeom prst="rect">
@@ -4385,7 +4385,7 @@
         </p:nvSpPr>
         <p:spPr>
           <a:xfrm>
-            <a:off x="3570831" y="4022543"/>
+            <a:off x="2991990" y="4022543"/>
             <a:ext cx="391886" cy="2202025"/>
           </a:xfrm>
           <a:prstGeom prst="rect">
@@ -4431,7 +4431,7 @@
         </p:nvSpPr>
         <p:spPr>
           <a:xfrm>
-            <a:off x="1678403" y="4698237"/>
+            <a:off x="1099562" y="4698237"/>
             <a:ext cx="622286" cy="523220"/>
           </a:xfrm>
           <a:prstGeom prst="rect">
@@ -4466,7 +4466,7 @@
         </p:nvSpPr>
         <p:spPr>
           <a:xfrm>
-            <a:off x="3556837" y="3634550"/>
+            <a:off x="2977996" y="3634550"/>
             <a:ext cx="367408" cy="369332"/>
           </a:xfrm>
           <a:prstGeom prst="rect">
@@ -4505,7 +4505,7 @@
         </p:nvSpPr>
         <p:spPr>
           <a:xfrm>
-            <a:off x="2962010" y="3634549"/>
+            <a:off x="2383169" y="3634549"/>
             <a:ext cx="367408" cy="369332"/>
           </a:xfrm>
           <a:prstGeom prst="rect">
@@ -4544,7 +4544,7 @@
         </p:nvSpPr>
         <p:spPr>
           <a:xfrm>
-            <a:off x="2365898" y="3634549"/>
+            <a:off x="1787057" y="3634549"/>
             <a:ext cx="367408" cy="369332"/>
           </a:xfrm>
           <a:prstGeom prst="rect">
@@ -4584,7 +4584,7 @@
         </p:nvSpPr>
         <p:spPr>
           <a:xfrm>
-            <a:off x="1261508" y="3634550"/>
+            <a:off x="682667" y="3634550"/>
             <a:ext cx="369012" cy="369332"/>
           </a:xfrm>
           <a:prstGeom prst="rect">
@@ -4623,7 +4623,7 @@
         </p:nvSpPr>
         <p:spPr>
           <a:xfrm>
-            <a:off x="4116675" y="4842855"/>
+            <a:off x="3537834" y="4842855"/>
             <a:ext cx="541519" cy="419879"/>
           </a:xfrm>
           <a:prstGeom prst="rightArrow">
@@ -4675,7 +4675,7 @@
         </p:nvSpPr>
         <p:spPr>
           <a:xfrm>
-            <a:off x="9463511" y="4871518"/>
+            <a:off x="9580957" y="4871518"/>
             <a:ext cx="541519" cy="419879"/>
           </a:xfrm>
           <a:prstGeom prst="rightArrow">
@@ -4727,7 +4727,7 @@
         </p:nvSpPr>
         <p:spPr>
           <a:xfrm>
-            <a:off x="10100953" y="4701547"/>
+            <a:off x="10218399" y="4701547"/>
             <a:ext cx="915844" cy="759823"/>
           </a:xfrm>
           <a:prstGeom prst="rect">
@@ -4776,7 +4776,7 @@
         </p:nvSpPr>
         <p:spPr>
           <a:xfrm>
-            <a:off x="5109296" y="3266589"/>
+            <a:off x="5046712" y="3265579"/>
             <a:ext cx="3977820" cy="369332"/>
           </a:xfrm>
           <a:prstGeom prst="rect">
@@ -4811,7 +4811,7 @@
         </p:nvSpPr>
         <p:spPr>
           <a:xfrm>
-            <a:off x="1808307" y="3240529"/>
+            <a:off x="1229466" y="3240529"/>
             <a:ext cx="1818575" cy="369332"/>
           </a:xfrm>
           <a:prstGeom prst="rect">
@@ -4846,7 +4846,7 @@
         </p:nvSpPr>
         <p:spPr>
           <a:xfrm rot="5400000">
-            <a:off x="2526228" y="5054664"/>
+            <a:off x="1947387" y="5054664"/>
             <a:ext cx="178101" cy="2694873"/>
           </a:xfrm>
           <a:prstGeom prst="rightBrace">
@@ -4893,7 +4893,7 @@
         </p:nvSpPr>
         <p:spPr>
           <a:xfrm>
-            <a:off x="2010516" y="6458705"/>
+            <a:off x="1489347" y="6450506"/>
             <a:ext cx="1276888" cy="369332"/>
           </a:xfrm>
           <a:prstGeom prst="rect">
@@ -4998,7 +4998,7 @@
         </p:nvSpPr>
         <p:spPr>
           <a:xfrm>
-            <a:off x="9291988" y="3300205"/>
+            <a:off x="9400622" y="3322807"/>
             <a:ext cx="1997663" cy="307777"/>
           </a:xfrm>
           <a:prstGeom prst="rect">
@@ -5093,7 +5093,7 @@
         </p:nvSpPr>
         <p:spPr>
           <a:xfrm>
-            <a:off x="4819921" y="3630584"/>
+            <a:off x="4241080" y="3630584"/>
             <a:ext cx="443056" cy="2873828"/>
           </a:xfrm>
           <a:prstGeom prst="rect">
@@ -5144,7 +5144,7 @@
         </p:nvSpPr>
         <p:spPr>
           <a:xfrm>
-            <a:off x="5476445" y="3630584"/>
+            <a:off x="4897604" y="3630584"/>
             <a:ext cx="443056" cy="2873828"/>
           </a:xfrm>
           <a:prstGeom prst="rect">
@@ -5195,7 +5195,7 @@
         </p:nvSpPr>
         <p:spPr>
           <a:xfrm>
-            <a:off x="6174278" y="3630584"/>
+            <a:off x="5595437" y="3630584"/>
             <a:ext cx="443056" cy="2873828"/>
           </a:xfrm>
           <a:prstGeom prst="rect">
@@ -5246,7 +5246,7 @@
         </p:nvSpPr>
         <p:spPr>
           <a:xfrm>
-            <a:off x="6853724" y="3630584"/>
+            <a:off x="6274883" y="3630584"/>
             <a:ext cx="443056" cy="2873828"/>
           </a:xfrm>
           <a:prstGeom prst="rect">
@@ -5297,7 +5297,7 @@
         </p:nvSpPr>
         <p:spPr>
           <a:xfrm>
-            <a:off x="7510248" y="3630584"/>
+            <a:off x="6931407" y="3630584"/>
             <a:ext cx="443056" cy="2873828"/>
           </a:xfrm>
           <a:prstGeom prst="rect">
@@ -5348,7 +5348,7 @@
         </p:nvSpPr>
         <p:spPr>
           <a:xfrm>
-            <a:off x="8208081" y="3630584"/>
+            <a:off x="7629240" y="3630584"/>
             <a:ext cx="443056" cy="2873828"/>
           </a:xfrm>
           <a:prstGeom prst="rect">
@@ -5399,7 +5399,7 @@
         </p:nvSpPr>
         <p:spPr>
           <a:xfrm rot="16200000">
-            <a:off x="4361014" y="4864168"/>
+            <a:off x="3782173" y="4864168"/>
             <a:ext cx="1320041" cy="369332"/>
           </a:xfrm>
           <a:prstGeom prst="rect">
@@ -5434,7 +5434,7 @@
         </p:nvSpPr>
         <p:spPr>
           <a:xfrm rot="16200000">
-            <a:off x="6398045" y="4864167"/>
+            <a:off x="5819204" y="4864167"/>
             <a:ext cx="1320041" cy="369332"/>
           </a:xfrm>
           <a:prstGeom prst="rect">
@@ -5469,7 +5469,7 @@
         </p:nvSpPr>
         <p:spPr>
           <a:xfrm rot="16200000">
-            <a:off x="5356686" y="4864167"/>
+            <a:off x="4777845" y="4864167"/>
             <a:ext cx="640688" cy="369332"/>
           </a:xfrm>
           <a:prstGeom prst="rect">
@@ -5504,7 +5504,7 @@
         </p:nvSpPr>
         <p:spPr>
           <a:xfrm rot="16200000">
-            <a:off x="7415879" y="4864167"/>
+            <a:off x="6837038" y="4864167"/>
             <a:ext cx="640688" cy="369332"/>
           </a:xfrm>
           <a:prstGeom prst="rect">
@@ -5539,7 +5539,7 @@
         </p:nvSpPr>
         <p:spPr>
           <a:xfrm rot="16200000">
-            <a:off x="5955518" y="4864165"/>
+            <a:off x="5376677" y="4864165"/>
             <a:ext cx="878959" cy="369332"/>
           </a:xfrm>
           <a:prstGeom prst="rect">
@@ -5574,7 +5574,7 @@
         </p:nvSpPr>
         <p:spPr>
           <a:xfrm rot="16200000">
-            <a:off x="7990129" y="4864166"/>
+            <a:off x="7411288" y="4864166"/>
             <a:ext cx="878959" cy="369332"/>
           </a:xfrm>
           <a:prstGeom prst="rect">
@@ -5609,7 +5609,7 @@
         </p:nvSpPr>
         <p:spPr>
           <a:xfrm>
-            <a:off x="8884406" y="3630584"/>
+            <a:off x="8305565" y="3630584"/>
             <a:ext cx="443056" cy="2873828"/>
           </a:xfrm>
           <a:prstGeom prst="rect">
@@ -5661,8 +5661,8 @@
         </p:nvSpPr>
         <p:spPr>
           <a:xfrm rot="16200000">
-            <a:off x="8721053" y="4881392"/>
-            <a:ext cx="769763" cy="369332"/>
+            <a:off x="8108485" y="4881392"/>
+            <a:ext cx="837217" cy="369332"/>
           </a:xfrm>
           <a:prstGeom prst="rect">
             <a:avLst/>
@@ -5677,7 +5677,94 @@
           <a:p>
             <a:r>
               <a:rPr lang="en-US" dirty="0"/>
-              <a:t>Dense</a:t>
+              <a:t>Flatten</a:t>
+            </a:r>
+          </a:p>
+        </p:txBody>
+      </p:sp>
+      <p:sp>
+        <p:nvSpPr>
+          <p:cNvPr id="49" name="Rectangle 48">
+            <a:extLst>
+              <a:ext uri="{FF2B5EF4-FFF2-40B4-BE49-F238E27FC236}">
+                <a16:creationId xmlns:a16="http://schemas.microsoft.com/office/drawing/2014/main" id="{F0CD8E00-6DAA-4DE2-89FC-865BFCAD2E81}"/>
+              </a:ext>
+            </a:extLst>
+          </p:cNvPr>
+          <p:cNvSpPr/>
+          <p:nvPr/>
+        </p:nvSpPr>
+        <p:spPr>
+          <a:xfrm>
+            <a:off x="8978482" y="3646608"/>
+            <a:ext cx="443056" cy="2873828"/>
+          </a:xfrm>
+          <a:prstGeom prst="rect">
+            <a:avLst/>
+          </a:prstGeom>
+          <a:noFill/>
+          <a:ln>
+            <a:solidFill>
+              <a:schemeClr val="tx1"/>
+            </a:solidFill>
+          </a:ln>
+        </p:spPr>
+        <p:style>
+          <a:lnRef idx="2">
+            <a:schemeClr val="accent1">
+              <a:shade val="50000"/>
+            </a:schemeClr>
+          </a:lnRef>
+          <a:fillRef idx="1">
+            <a:schemeClr val="accent1"/>
+          </a:fillRef>
+          <a:effectRef idx="0">
+            <a:schemeClr val="accent1"/>
+          </a:effectRef>
+          <a:fontRef idx="minor">
+            <a:schemeClr val="lt1"/>
+          </a:fontRef>
+        </p:style>
+        <p:txBody>
+          <a:bodyPr rtlCol="0" anchor="ctr"/>
+          <a:lstStyle/>
+          <a:p>
+            <a:pPr algn="ctr"/>
+            <a:endParaRPr lang="en-US"/>
+          </a:p>
+        </p:txBody>
+      </p:sp>
+      <p:sp>
+        <p:nvSpPr>
+          <p:cNvPr id="50" name="TextBox 49">
+            <a:extLst>
+              <a:ext uri="{FF2B5EF4-FFF2-40B4-BE49-F238E27FC236}">
+                <a16:creationId xmlns:a16="http://schemas.microsoft.com/office/drawing/2014/main" id="{EBDFA63F-B71E-4255-B207-F363ED23B521}"/>
+              </a:ext>
+            </a:extLst>
+          </p:cNvPr>
+          <p:cNvSpPr txBox="1"/>
+          <p:nvPr/>
+        </p:nvSpPr>
+        <p:spPr>
+          <a:xfrm rot="16200000">
+            <a:off x="8497350" y="4897416"/>
+            <a:ext cx="1405321" cy="369332"/>
+          </a:xfrm>
+          <a:prstGeom prst="rect">
+            <a:avLst/>
+          </a:prstGeom>
+          <a:noFill/>
+        </p:spPr>
+        <p:txBody>
+          <a:bodyPr wrap="none" rtlCol="0">
+            <a:spAutoFit/>
+          </a:bodyPr>
+          <a:lstStyle/>
+          <a:p>
+            <a:r>
+              <a:rPr lang="en-US" dirty="0"/>
+              <a:t>Classification</a:t>
             </a:r>
           </a:p>
         </p:txBody>
@@ -9227,7 +9314,7 @@
         </p:nvGrpSpPr>
         <p:grpSpPr>
           <a:xfrm>
-            <a:off x="2522370" y="1621749"/>
+            <a:off x="2270700" y="1621749"/>
             <a:ext cx="462786" cy="2873828"/>
             <a:chOff x="3144670" y="1621749"/>
             <a:chExt cx="462786" cy="2873828"/>
@@ -9334,7 +9421,7 @@
         </p:nvGrpSpPr>
         <p:grpSpPr>
           <a:xfrm>
-            <a:off x="4551809" y="1627768"/>
+            <a:off x="4300139" y="1627768"/>
             <a:ext cx="462786" cy="2873828"/>
             <a:chOff x="5174109" y="1627768"/>
             <a:chExt cx="462786" cy="2873828"/>
@@ -9441,7 +9528,7 @@
         </p:nvGrpSpPr>
         <p:grpSpPr>
           <a:xfrm>
-            <a:off x="3174530" y="1627768"/>
+            <a:off x="2922860" y="1627768"/>
             <a:ext cx="462786" cy="2873828"/>
             <a:chOff x="3796830" y="1627768"/>
             <a:chExt cx="462786" cy="2873828"/>
@@ -9548,7 +9635,7 @@
         </p:nvGrpSpPr>
         <p:grpSpPr>
           <a:xfrm>
-            <a:off x="5208333" y="1627768"/>
+            <a:off x="4956663" y="1627768"/>
             <a:ext cx="462786" cy="2873828"/>
             <a:chOff x="5830633" y="1627768"/>
             <a:chExt cx="462786" cy="2873828"/>
@@ -9655,7 +9742,7 @@
         </p:nvGrpSpPr>
         <p:grpSpPr>
           <a:xfrm>
-            <a:off x="3872363" y="1627768"/>
+            <a:off x="3620693" y="1627768"/>
             <a:ext cx="462786" cy="2873828"/>
             <a:chOff x="4494663" y="1627768"/>
             <a:chExt cx="462786" cy="2873828"/>
@@ -9762,7 +9849,7 @@
         </p:nvGrpSpPr>
         <p:grpSpPr>
           <a:xfrm>
-            <a:off x="5906166" y="1627768"/>
+            <a:off x="5654496" y="1627768"/>
             <a:ext cx="462786" cy="2873828"/>
             <a:chOff x="6528466" y="1627768"/>
             <a:chExt cx="462786" cy="2873828"/>
@@ -9917,7 +10004,7 @@
         </p:nvSpPr>
         <p:spPr>
           <a:xfrm>
-            <a:off x="2485843" y="989521"/>
+            <a:off x="2311229" y="977483"/>
             <a:ext cx="3977820" cy="369332"/>
           </a:xfrm>
           <a:prstGeom prst="rect">
@@ -10532,6 +10619,93 @@
           <a:p>
             <a:pPr algn="ctr"/>
             <a:endParaRPr lang="en-US"/>
+          </a:p>
+        </p:txBody>
+      </p:sp>
+      <p:sp>
+        <p:nvSpPr>
+          <p:cNvPr id="35" name="Rectangle 34">
+            <a:extLst>
+              <a:ext uri="{FF2B5EF4-FFF2-40B4-BE49-F238E27FC236}">
+                <a16:creationId xmlns:a16="http://schemas.microsoft.com/office/drawing/2014/main" id="{6F63BF09-7022-420F-A9B5-10AAF8463326}"/>
+              </a:ext>
+            </a:extLst>
+          </p:cNvPr>
+          <p:cNvSpPr/>
+          <p:nvPr/>
+        </p:nvSpPr>
+        <p:spPr>
+          <a:xfrm>
+            <a:off x="6327983" y="1621749"/>
+            <a:ext cx="443056" cy="2873828"/>
+          </a:xfrm>
+          <a:prstGeom prst="rect">
+            <a:avLst/>
+          </a:prstGeom>
+          <a:noFill/>
+          <a:ln>
+            <a:solidFill>
+              <a:schemeClr val="tx1"/>
+            </a:solidFill>
+          </a:ln>
+        </p:spPr>
+        <p:style>
+          <a:lnRef idx="2">
+            <a:schemeClr val="accent1">
+              <a:shade val="50000"/>
+            </a:schemeClr>
+          </a:lnRef>
+          <a:fillRef idx="1">
+            <a:schemeClr val="accent1"/>
+          </a:fillRef>
+          <a:effectRef idx="0">
+            <a:schemeClr val="accent1"/>
+          </a:effectRef>
+          <a:fontRef idx="minor">
+            <a:schemeClr val="lt1"/>
+          </a:fontRef>
+        </p:style>
+        <p:txBody>
+          <a:bodyPr rtlCol="0" anchor="ctr"/>
+          <a:lstStyle/>
+          <a:p>
+            <a:pPr algn="ctr"/>
+            <a:endParaRPr lang="en-US" dirty="0"/>
+          </a:p>
+        </p:txBody>
+      </p:sp>
+      <p:sp>
+        <p:nvSpPr>
+          <p:cNvPr id="37" name="TextBox 36">
+            <a:extLst>
+              <a:ext uri="{FF2B5EF4-FFF2-40B4-BE49-F238E27FC236}">
+                <a16:creationId xmlns:a16="http://schemas.microsoft.com/office/drawing/2014/main" id="{E7654377-F53E-47AF-8310-A6C31ED0FEB4}"/>
+              </a:ext>
+            </a:extLst>
+          </p:cNvPr>
+          <p:cNvSpPr txBox="1"/>
+          <p:nvPr/>
+        </p:nvSpPr>
+        <p:spPr>
+          <a:xfrm rot="16200000">
+            <a:off x="6112396" y="2873996"/>
+            <a:ext cx="878959" cy="369332"/>
+          </a:xfrm>
+          <a:prstGeom prst="rect">
+            <a:avLst/>
+          </a:prstGeom>
+          <a:noFill/>
+        </p:spPr>
+        <p:txBody>
+          <a:bodyPr wrap="square" rtlCol="0">
+            <a:spAutoFit/>
+          </a:bodyPr>
+          <a:lstStyle/>
+          <a:p>
+            <a:r>
+              <a:rPr lang="en-US" dirty="0"/>
+              <a:t>Flatten</a:t>
+            </a:r>
           </a:p>
         </p:txBody>
       </p:sp>
@@ -12182,10 +12356,10 @@
       </p:sp>
       <p:pic>
         <p:nvPicPr>
-          <p:cNvPr id="4" name="Picture 3">
-            <a:extLst>
-              <a:ext uri="{FF2B5EF4-FFF2-40B4-BE49-F238E27FC236}">
-                <a16:creationId xmlns:a16="http://schemas.microsoft.com/office/drawing/2014/main" id="{9C3D595C-01EF-41C3-8613-24ACFAA2A181}"/>
+          <p:cNvPr id="5" name="Picture 4">
+            <a:extLst>
+              <a:ext uri="{FF2B5EF4-FFF2-40B4-BE49-F238E27FC236}">
+                <a16:creationId xmlns:a16="http://schemas.microsoft.com/office/drawing/2014/main" id="{0627DF0A-1F15-4C15-B6D2-CBE1912AEFD8}"/>
               </a:ext>
             </a:extLst>
           </p:cNvPr>
@@ -12200,8 +12374,8 @@
         </p:blipFill>
         <p:spPr>
           <a:xfrm>
-            <a:off x="2267337" y="1268963"/>
-            <a:ext cx="7417837" cy="4711959"/>
+            <a:off x="1707502" y="1031032"/>
+            <a:ext cx="9069355" cy="4795935"/>
           </a:xfrm>
           <a:prstGeom prst="rect">
             <a:avLst/>
@@ -22919,7 +23093,7 @@
         </p:nvSpPr>
         <p:spPr>
           <a:xfrm>
-            <a:off x="3160036" y="1627768"/>
+            <a:off x="3352983" y="1627768"/>
             <a:ext cx="443056" cy="2873828"/>
           </a:xfrm>
           <a:prstGeom prst="rect">
@@ -22970,7 +23144,7 @@
         </p:nvSpPr>
         <p:spPr>
           <a:xfrm>
-            <a:off x="3816560" y="1627768"/>
+            <a:off x="4009507" y="1627768"/>
             <a:ext cx="443056" cy="2873828"/>
           </a:xfrm>
           <a:prstGeom prst="rect">
@@ -23021,7 +23195,7 @@
         </p:nvSpPr>
         <p:spPr>
           <a:xfrm>
-            <a:off x="4514393" y="1627768"/>
+            <a:off x="4707340" y="1627768"/>
             <a:ext cx="443056" cy="2873828"/>
           </a:xfrm>
           <a:prstGeom prst="rect">
@@ -23072,7 +23246,7 @@
         </p:nvSpPr>
         <p:spPr>
           <a:xfrm>
-            <a:off x="5193839" y="1627768"/>
+            <a:off x="5386786" y="1627768"/>
             <a:ext cx="443056" cy="2873828"/>
           </a:xfrm>
           <a:prstGeom prst="rect">
@@ -23123,7 +23297,7 @@
         </p:nvSpPr>
         <p:spPr>
           <a:xfrm>
-            <a:off x="5850363" y="1627768"/>
+            <a:off x="6043310" y="1627768"/>
             <a:ext cx="443056" cy="2873828"/>
           </a:xfrm>
           <a:prstGeom prst="rect">
@@ -23174,7 +23348,7 @@
         </p:nvSpPr>
         <p:spPr>
           <a:xfrm>
-            <a:off x="6548196" y="1627768"/>
+            <a:off x="6741143" y="1627768"/>
             <a:ext cx="443056" cy="2873828"/>
           </a:xfrm>
           <a:prstGeom prst="rect">
@@ -23225,7 +23399,7 @@
         </p:nvSpPr>
         <p:spPr>
           <a:xfrm rot="16200000">
-            <a:off x="2701129" y="2861352"/>
+            <a:off x="2894076" y="2861352"/>
             <a:ext cx="1320041" cy="369332"/>
           </a:xfrm>
           <a:prstGeom prst="rect">
@@ -23260,7 +23434,7 @@
         </p:nvSpPr>
         <p:spPr>
           <a:xfrm rot="16200000">
-            <a:off x="4738160" y="2861351"/>
+            <a:off x="4931107" y="2861351"/>
             <a:ext cx="1320041" cy="369332"/>
           </a:xfrm>
           <a:prstGeom prst="rect">
@@ -23295,7 +23469,7 @@
         </p:nvSpPr>
         <p:spPr>
           <a:xfrm rot="16200000">
-            <a:off x="3696801" y="2861351"/>
+            <a:off x="3889748" y="2861351"/>
             <a:ext cx="640688" cy="369332"/>
           </a:xfrm>
           <a:prstGeom prst="rect">
@@ -23330,7 +23504,7 @@
         </p:nvSpPr>
         <p:spPr>
           <a:xfrm rot="16200000">
-            <a:off x="5755994" y="2861351"/>
+            <a:off x="5948941" y="2861351"/>
             <a:ext cx="640688" cy="369332"/>
           </a:xfrm>
           <a:prstGeom prst="rect">
@@ -23365,7 +23539,7 @@
         </p:nvSpPr>
         <p:spPr>
           <a:xfrm rot="16200000">
-            <a:off x="4295633" y="2861349"/>
+            <a:off x="4488580" y="2861349"/>
             <a:ext cx="878959" cy="369332"/>
           </a:xfrm>
           <a:prstGeom prst="rect">
@@ -23400,7 +23574,7 @@
         </p:nvSpPr>
         <p:spPr>
           <a:xfrm rot="16200000">
-            <a:off x="6330244" y="2861350"/>
+            <a:off x="6523191" y="2861350"/>
             <a:ext cx="878959" cy="369332"/>
           </a:xfrm>
           <a:prstGeom prst="rect">
@@ -23435,7 +23609,7 @@
         </p:nvSpPr>
         <p:spPr>
           <a:xfrm>
-            <a:off x="7224521" y="1627768"/>
+            <a:off x="7417468" y="1627768"/>
             <a:ext cx="443056" cy="2873828"/>
           </a:xfrm>
           <a:prstGeom prst="rect">
@@ -23487,8 +23661,8 @@
         </p:nvSpPr>
         <p:spPr>
           <a:xfrm rot="16200000">
-            <a:off x="7061168" y="2878576"/>
-            <a:ext cx="769763" cy="369332"/>
+            <a:off x="7220388" y="2878576"/>
+            <a:ext cx="837217" cy="369332"/>
           </a:xfrm>
           <a:prstGeom prst="rect">
             <a:avLst/>
@@ -23503,7 +23677,7 @@
           <a:p>
             <a:r>
               <a:rPr lang="en-US" dirty="0"/>
-              <a:t>Dense</a:t>
+              <a:t>Flatten</a:t>
             </a:r>
           </a:p>
         </p:txBody>
@@ -23522,8 +23696,8 @@
         </p:nvSpPr>
         <p:spPr>
           <a:xfrm>
-            <a:off x="2516777" y="836023"/>
-            <a:ext cx="5674724" cy="4119154"/>
+            <a:off x="2709723" y="836023"/>
+            <a:ext cx="6014827" cy="4119154"/>
           </a:xfrm>
           <a:prstGeom prst="rect">
             <a:avLst/>
@@ -23570,7 +23744,7 @@
         </p:nvSpPr>
         <p:spPr>
           <a:xfrm>
-            <a:off x="3501843" y="989521"/>
+            <a:off x="3694790" y="989521"/>
             <a:ext cx="3977820" cy="369332"/>
           </a:xfrm>
           <a:prstGeom prst="rect">
@@ -23605,7 +23779,7 @@
         </p:nvSpPr>
         <p:spPr>
           <a:xfrm>
-            <a:off x="1365011" y="1204123"/>
+            <a:off x="1557958" y="1204123"/>
             <a:ext cx="391886" cy="3483429"/>
           </a:xfrm>
           <a:prstGeom prst="rect">
@@ -23657,7 +23831,7 @@
         </p:nvSpPr>
         <p:spPr>
           <a:xfrm>
-            <a:off x="1808165" y="2686594"/>
+            <a:off x="2001112" y="2686594"/>
             <a:ext cx="650806" cy="418012"/>
           </a:xfrm>
           <a:prstGeom prst="rightArrow">
@@ -23703,7 +23877,7 @@
         </p:nvSpPr>
         <p:spPr>
           <a:xfrm rot="16200000">
-            <a:off x="1169726" y="2674513"/>
+            <a:off x="1362673" y="2674513"/>
             <a:ext cx="684803" cy="369332"/>
           </a:xfrm>
           <a:prstGeom prst="rect">
@@ -23738,7 +23912,7 @@
         </p:nvSpPr>
         <p:spPr>
           <a:xfrm>
-            <a:off x="8277177" y="2719958"/>
+            <a:off x="8839240" y="2719958"/>
             <a:ext cx="650806" cy="418012"/>
           </a:xfrm>
           <a:prstGeom prst="rightArrow">
@@ -23784,7 +23958,7 @@
         </p:nvSpPr>
         <p:spPr>
           <a:xfrm>
-            <a:off x="8999721" y="2518954"/>
+            <a:off x="9561784" y="2518954"/>
             <a:ext cx="1201783" cy="783772"/>
           </a:xfrm>
           <a:prstGeom prst="rect">
@@ -23843,7 +24017,7 @@
         </p:nvSpPr>
         <p:spPr>
           <a:xfrm rot="16200000">
-            <a:off x="3876450" y="4280733"/>
+            <a:off x="4069397" y="4280733"/>
             <a:ext cx="364585" cy="1797413"/>
           </a:xfrm>
           <a:prstGeom prst="leftBrace">
@@ -23887,7 +24061,7 @@
         </p:nvSpPr>
         <p:spPr>
           <a:xfrm>
-            <a:off x="3487917" y="5372629"/>
+            <a:off x="3680864" y="5372629"/>
             <a:ext cx="1413144" cy="1169551"/>
           </a:xfrm>
           <a:prstGeom prst="rect">
@@ -23946,7 +24120,7 @@
         </p:nvSpPr>
         <p:spPr>
           <a:xfrm rot="16200000">
-            <a:off x="5923491" y="4279634"/>
+            <a:off x="6116438" y="4279634"/>
             <a:ext cx="364585" cy="1797413"/>
           </a:xfrm>
           <a:prstGeom prst="leftBrace">
@@ -23990,7 +24164,7 @@
         </p:nvSpPr>
         <p:spPr>
           <a:xfrm>
-            <a:off x="5554432" y="5372628"/>
+            <a:off x="5747379" y="5372628"/>
             <a:ext cx="1413144" cy="1169551"/>
           </a:xfrm>
           <a:prstGeom prst="rect">
@@ -24049,8 +24223,8 @@
         </p:nvSpPr>
         <p:spPr>
           <a:xfrm>
-            <a:off x="1129004" y="681135"/>
-            <a:ext cx="9254831" cy="5861044"/>
+            <a:off x="1275127" y="681135"/>
+            <a:ext cx="9744809" cy="5861044"/>
           </a:xfrm>
           <a:prstGeom prst="rect">
             <a:avLst/>
@@ -24080,6 +24254,93 @@
           <a:p>
             <a:pPr algn="ctr"/>
             <a:endParaRPr lang="en-US"/>
+          </a:p>
+        </p:txBody>
+      </p:sp>
+      <p:sp>
+        <p:nvSpPr>
+          <p:cNvPr id="29" name="Rectangle 28">
+            <a:extLst>
+              <a:ext uri="{FF2B5EF4-FFF2-40B4-BE49-F238E27FC236}">
+                <a16:creationId xmlns:a16="http://schemas.microsoft.com/office/drawing/2014/main" id="{3C28CAEE-1733-4489-B794-3142A64BBE2B}"/>
+              </a:ext>
+            </a:extLst>
+          </p:cNvPr>
+          <p:cNvSpPr/>
+          <p:nvPr/>
+        </p:nvSpPr>
+        <p:spPr>
+          <a:xfrm>
+            <a:off x="8082658" y="1626328"/>
+            <a:ext cx="443056" cy="2873828"/>
+          </a:xfrm>
+          <a:prstGeom prst="rect">
+            <a:avLst/>
+          </a:prstGeom>
+          <a:noFill/>
+          <a:ln>
+            <a:solidFill>
+              <a:schemeClr val="tx1"/>
+            </a:solidFill>
+          </a:ln>
+        </p:spPr>
+        <p:style>
+          <a:lnRef idx="2">
+            <a:schemeClr val="accent1">
+              <a:shade val="50000"/>
+            </a:schemeClr>
+          </a:lnRef>
+          <a:fillRef idx="1">
+            <a:schemeClr val="accent1"/>
+          </a:fillRef>
+          <a:effectRef idx="0">
+            <a:schemeClr val="accent1"/>
+          </a:effectRef>
+          <a:fontRef idx="minor">
+            <a:schemeClr val="lt1"/>
+          </a:fontRef>
+        </p:style>
+        <p:txBody>
+          <a:bodyPr rtlCol="0" anchor="ctr"/>
+          <a:lstStyle/>
+          <a:p>
+            <a:pPr algn="ctr"/>
+            <a:endParaRPr lang="en-US"/>
+          </a:p>
+        </p:txBody>
+      </p:sp>
+      <p:sp>
+        <p:nvSpPr>
+          <p:cNvPr id="30" name="TextBox 29">
+            <a:extLst>
+              <a:ext uri="{FF2B5EF4-FFF2-40B4-BE49-F238E27FC236}">
+                <a16:creationId xmlns:a16="http://schemas.microsoft.com/office/drawing/2014/main" id="{95CDF354-0925-4213-A727-9AF56DD07698}"/>
+              </a:ext>
+            </a:extLst>
+          </p:cNvPr>
+          <p:cNvSpPr txBox="1"/>
+          <p:nvPr/>
+        </p:nvSpPr>
+        <p:spPr>
+          <a:xfrm rot="16200000">
+            <a:off x="7564664" y="2859452"/>
+            <a:ext cx="1405321" cy="369332"/>
+          </a:xfrm>
+          <a:prstGeom prst="rect">
+            <a:avLst/>
+          </a:prstGeom>
+          <a:noFill/>
+        </p:spPr>
+        <p:txBody>
+          <a:bodyPr wrap="none" rtlCol="0">
+            <a:spAutoFit/>
+          </a:bodyPr>
+          <a:lstStyle/>
+          <a:p>
+            <a:r>
+              <a:rPr lang="en-US" dirty="0"/>
+              <a:t>Classification</a:t>
+            </a:r>
           </a:p>
         </p:txBody>
       </p:sp>

</xml_diff>

<commit_message>
minor update to include 1D CNN eng features
</commit_message>
<xml_diff>
--- a/CapstoneP2/ReportOuts/ModelApproachSensorTimeSeriesData.pptx
+++ b/CapstoneP2/ReportOuts/ModelApproachSensorTimeSeriesData.pptx
@@ -273,7 +273,7 @@
           <a:p>
             <a:fld id="{41700D12-4FA1-4E13-9BF0-A2DB108FDA70}" type="datetimeFigureOut">
               <a:rPr lang="en-US" smtClean="0"/>
-              <a:t>2/18/2020</a:t>
+              <a:t>2/25/2020</a:t>
             </a:fld>
             <a:endParaRPr lang="en-US"/>
           </a:p>
@@ -471,7 +471,7 @@
           <a:p>
             <a:fld id="{41700D12-4FA1-4E13-9BF0-A2DB108FDA70}" type="datetimeFigureOut">
               <a:rPr lang="en-US" smtClean="0"/>
-              <a:t>2/18/2020</a:t>
+              <a:t>2/25/2020</a:t>
             </a:fld>
             <a:endParaRPr lang="en-US"/>
           </a:p>
@@ -679,7 +679,7 @@
           <a:p>
             <a:fld id="{41700D12-4FA1-4E13-9BF0-A2DB108FDA70}" type="datetimeFigureOut">
               <a:rPr lang="en-US" smtClean="0"/>
-              <a:t>2/18/2020</a:t>
+              <a:t>2/25/2020</a:t>
             </a:fld>
             <a:endParaRPr lang="en-US"/>
           </a:p>
@@ -877,7 +877,7 @@
           <a:p>
             <a:fld id="{41700D12-4FA1-4E13-9BF0-A2DB108FDA70}" type="datetimeFigureOut">
               <a:rPr lang="en-US" smtClean="0"/>
-              <a:t>2/18/2020</a:t>
+              <a:t>2/25/2020</a:t>
             </a:fld>
             <a:endParaRPr lang="en-US"/>
           </a:p>
@@ -1152,7 +1152,7 @@
           <a:p>
             <a:fld id="{41700D12-4FA1-4E13-9BF0-A2DB108FDA70}" type="datetimeFigureOut">
               <a:rPr lang="en-US" smtClean="0"/>
-              <a:t>2/18/2020</a:t>
+              <a:t>2/25/2020</a:t>
             </a:fld>
             <a:endParaRPr lang="en-US"/>
           </a:p>
@@ -1417,7 +1417,7 @@
           <a:p>
             <a:fld id="{41700D12-4FA1-4E13-9BF0-A2DB108FDA70}" type="datetimeFigureOut">
               <a:rPr lang="en-US" smtClean="0"/>
-              <a:t>2/18/2020</a:t>
+              <a:t>2/25/2020</a:t>
             </a:fld>
             <a:endParaRPr lang="en-US"/>
           </a:p>
@@ -1829,7 +1829,7 @@
           <a:p>
             <a:fld id="{41700D12-4FA1-4E13-9BF0-A2DB108FDA70}" type="datetimeFigureOut">
               <a:rPr lang="en-US" smtClean="0"/>
-              <a:t>2/18/2020</a:t>
+              <a:t>2/25/2020</a:t>
             </a:fld>
             <a:endParaRPr lang="en-US"/>
           </a:p>
@@ -1970,7 +1970,7 @@
           <a:p>
             <a:fld id="{41700D12-4FA1-4E13-9BF0-A2DB108FDA70}" type="datetimeFigureOut">
               <a:rPr lang="en-US" smtClean="0"/>
-              <a:t>2/18/2020</a:t>
+              <a:t>2/25/2020</a:t>
             </a:fld>
             <a:endParaRPr lang="en-US"/>
           </a:p>
@@ -2083,7 +2083,7 @@
           <a:p>
             <a:fld id="{41700D12-4FA1-4E13-9BF0-A2DB108FDA70}" type="datetimeFigureOut">
               <a:rPr lang="en-US" smtClean="0"/>
-              <a:t>2/18/2020</a:t>
+              <a:t>2/25/2020</a:t>
             </a:fld>
             <a:endParaRPr lang="en-US"/>
           </a:p>
@@ -2394,7 +2394,7 @@
           <a:p>
             <a:fld id="{41700D12-4FA1-4E13-9BF0-A2DB108FDA70}" type="datetimeFigureOut">
               <a:rPr lang="en-US" smtClean="0"/>
-              <a:t>2/18/2020</a:t>
+              <a:t>2/25/2020</a:t>
             </a:fld>
             <a:endParaRPr lang="en-US"/>
           </a:p>
@@ -2682,7 +2682,7 @@
           <a:p>
             <a:fld id="{41700D12-4FA1-4E13-9BF0-A2DB108FDA70}" type="datetimeFigureOut">
               <a:rPr lang="en-US" smtClean="0"/>
-              <a:t>2/18/2020</a:t>
+              <a:t>2/25/2020</a:t>
             </a:fld>
             <a:endParaRPr lang="en-US"/>
           </a:p>
@@ -2923,7 +2923,7 @@
           <a:p>
             <a:fld id="{41700D12-4FA1-4E13-9BF0-A2DB108FDA70}" type="datetimeFigureOut">
               <a:rPr lang="en-US" smtClean="0"/>
-              <a:t>2/18/2020</a:t>
+              <a:t>2/25/2020</a:t>
             </a:fld>
             <a:endParaRPr lang="en-US"/>
           </a:p>
@@ -3382,8 +3382,8 @@
         </p:nvSpPr>
         <p:spPr>
           <a:xfrm>
-            <a:off x="104981" y="833536"/>
-            <a:ext cx="8223341" cy="6370975"/>
+            <a:off x="104981" y="791591"/>
+            <a:ext cx="8223341" cy="6863417"/>
           </a:xfrm>
           <a:prstGeom prst="rect">
             <a:avLst/>
@@ -3571,6 +3571,16 @@
             <a:r>
               <a:rPr lang="en-US" sz="1600" dirty="0"/>
               <a:t>Fast Fourier Transform + Discrete Wavelet Transform</a:t>
+            </a:r>
+          </a:p>
+          <a:p>
+            <a:pPr marL="800100" lvl="1" indent="-342900">
+              <a:buFont typeface="Courier New" panose="02070309020205020404" pitchFamily="49" charset="0"/>
+              <a:buChar char="o"/>
+            </a:pPr>
+            <a:r>
+              <a:rPr lang="en-US" sz="1600" dirty="0"/>
+              <a:t>Fast Fourier Transform + Discrete Wavelet Transform + 1D CNN</a:t>
             </a:r>
           </a:p>
           <a:p>

</xml_diff>